<commit_message>
Update 1 semester 2024-1
Added intro ppt, updated ppt's 1 & 2
</commit_message>
<xml_diff>
--- a/Source ppts/1 Programas secuenciales.pptx
+++ b/Source ppts/1 Programas secuenciales.pptx
@@ -5,7 +5,7 @@
     <p:sldMasterId id="2147483672" r:id="rId1"/>
   </p:sldMasterIdLst>
   <p:notesMasterIdLst>
-    <p:notesMasterId r:id="rId16"/>
+    <p:notesMasterId r:id="rId18"/>
   </p:notesMasterIdLst>
   <p:sldIdLst>
     <p:sldId id="256" r:id="rId2"/>
@@ -21,35 +21,37 @@
     <p:sldId id="303" r:id="rId12"/>
     <p:sldId id="305" r:id="rId13"/>
     <p:sldId id="306" r:id="rId14"/>
-    <p:sldId id="307" r:id="rId15"/>
+    <p:sldId id="308" r:id="rId15"/>
+    <p:sldId id="309" r:id="rId16"/>
+    <p:sldId id="307" r:id="rId17"/>
   </p:sldIdLst>
   <p:sldSz cx="9144000" cy="5143500" type="screen16x9"/>
   <p:notesSz cx="6858000" cy="9144000"/>
   <p:embeddedFontLst>
     <p:embeddedFont>
       <p:font typeface="Denk One" panose="020B0604020202020204" charset="0"/>
-      <p:regular r:id="rId17"/>
+      <p:regular r:id="rId19"/>
     </p:embeddedFont>
     <p:embeddedFont>
       <p:font typeface="Fira Sans Extra Condensed" panose="020B0503050000020004" pitchFamily="34" charset="0"/>
-      <p:regular r:id="rId18"/>
-      <p:bold r:id="rId19"/>
-      <p:italic r:id="rId20"/>
-      <p:boldItalic r:id="rId21"/>
+      <p:regular r:id="rId20"/>
+      <p:bold r:id="rId21"/>
+      <p:italic r:id="rId22"/>
+      <p:boldItalic r:id="rId23"/>
     </p:embeddedFont>
     <p:embeddedFont>
       <p:font typeface="Quantico" panose="020B0604020202020204" charset="0"/>
-      <p:regular r:id="rId22"/>
-      <p:bold r:id="rId23"/>
-      <p:italic r:id="rId24"/>
-      <p:boldItalic r:id="rId25"/>
+      <p:regular r:id="rId24"/>
+      <p:bold r:id="rId25"/>
+      <p:italic r:id="rId26"/>
+      <p:boldItalic r:id="rId27"/>
     </p:embeddedFont>
     <p:embeddedFont>
       <p:font typeface="Source Code Pro" panose="020B0509030403020204" pitchFamily="49" charset="0"/>
-      <p:regular r:id="rId26"/>
-      <p:bold r:id="rId27"/>
-      <p:italic r:id="rId28"/>
-      <p:boldItalic r:id="rId29"/>
+      <p:regular r:id="rId28"/>
+      <p:bold r:id="rId29"/>
+      <p:italic r:id="rId30"/>
+      <p:boldItalic r:id="rId31"/>
     </p:embeddedFont>
   </p:embeddedFontLst>
   <p:defaultTextStyle>
@@ -292,13 +294,84 @@
 <file path=ppt/revisionInfo.xml><?xml version="1.0" encoding="utf-8"?>
 <p1510:revInfo xmlns:a="http://schemas.openxmlformats.org/drawingml/2006/main" xmlns:r="http://schemas.openxmlformats.org/officeDocument/2006/relationships" xmlns:p1510="http://schemas.microsoft.com/office/powerpoint/2015/10/main">
   <p1510:revLst>
-    <p1510:client id="{52D01A48-4AA0-4FDB-B1ED-11ECB3F35E11}" v="19" dt="2023-08-09T18:52:57.020"/>
+    <p1510:client id="{EDE87E0B-BE4A-46C6-BB28-15281E54BCA4}" v="2" dt="2024-03-14T23:28:25.617"/>
   </p1510:revLst>
 </p1510:revInfo>
 </file>
 
 <file path=ppt/changesInfos/changesInfo1.xml><?xml version="1.0" encoding="utf-8"?>
 <pc:chgInfo xmlns:a="http://schemas.openxmlformats.org/drawingml/2006/main" xmlns:r="http://schemas.openxmlformats.org/officeDocument/2006/relationships" xmlns:ac="http://schemas.microsoft.com/office/drawing/2013/main/command" xmlns:pc="http://schemas.microsoft.com/office/powerpoint/2013/main/command">
+  <pc:docChgLst>
+    <pc:chgData name="Rolando Rojas Sanfuentes (Alumno)" userId="2c56a9b6-e5a8-48f6-bb7c-ce0866612bbb" providerId="ADAL" clId="{EDE87E0B-BE4A-46C6-BB28-15281E54BCA4}"/>
+    <pc:docChg chg="custSel addSld modSld">
+      <pc:chgData name="Rolando Rojas Sanfuentes (Alumno)" userId="2c56a9b6-e5a8-48f6-bb7c-ce0866612bbb" providerId="ADAL" clId="{EDE87E0B-BE4A-46C6-BB28-15281E54BCA4}" dt="2024-03-14T23:30:39.942" v="53" actId="478"/>
+      <pc:docMkLst>
+        <pc:docMk/>
+      </pc:docMkLst>
+      <pc:sldChg chg="addSp modSp add mod">
+        <pc:chgData name="Rolando Rojas Sanfuentes (Alumno)" userId="2c56a9b6-e5a8-48f6-bb7c-ce0866612bbb" providerId="ADAL" clId="{EDE87E0B-BE4A-46C6-BB28-15281E54BCA4}" dt="2024-03-14T23:28:10.118" v="46" actId="14100"/>
+        <pc:sldMkLst>
+          <pc:docMk/>
+          <pc:sldMk cId="3706274740" sldId="308"/>
+        </pc:sldMkLst>
+        <pc:spChg chg="mod">
+          <ac:chgData name="Rolando Rojas Sanfuentes (Alumno)" userId="2c56a9b6-e5a8-48f6-bb7c-ce0866612bbb" providerId="ADAL" clId="{EDE87E0B-BE4A-46C6-BB28-15281E54BCA4}" dt="2024-03-14T23:22:20.411" v="2" actId="20577"/>
+          <ac:spMkLst>
+            <pc:docMk/>
+            <pc:sldMk cId="3706274740" sldId="308"/>
+            <ac:spMk id="295" creationId="{00000000-0000-0000-0000-000000000000}"/>
+          </ac:spMkLst>
+        </pc:spChg>
+        <pc:spChg chg="mod">
+          <ac:chgData name="Rolando Rojas Sanfuentes (Alumno)" userId="2c56a9b6-e5a8-48f6-bb7c-ce0866612bbb" providerId="ADAL" clId="{EDE87E0B-BE4A-46C6-BB28-15281E54BCA4}" dt="2024-03-14T23:28:03.453" v="44" actId="20577"/>
+          <ac:spMkLst>
+            <pc:docMk/>
+            <pc:sldMk cId="3706274740" sldId="308"/>
+            <ac:spMk id="297" creationId="{00000000-0000-0000-0000-000000000000}"/>
+          </ac:spMkLst>
+        </pc:spChg>
+        <pc:picChg chg="add mod">
+          <ac:chgData name="Rolando Rojas Sanfuentes (Alumno)" userId="2c56a9b6-e5a8-48f6-bb7c-ce0866612bbb" providerId="ADAL" clId="{EDE87E0B-BE4A-46C6-BB28-15281E54BCA4}" dt="2024-03-14T23:28:10.118" v="46" actId="14100"/>
+          <ac:picMkLst>
+            <pc:docMk/>
+            <pc:sldMk cId="3706274740" sldId="308"/>
+            <ac:picMk id="3" creationId="{CAF7AEE0-F44D-E903-297B-A852795B382E}"/>
+          </ac:picMkLst>
+        </pc:picChg>
+      </pc:sldChg>
+      <pc:sldChg chg="addSp delSp modSp add mod">
+        <pc:chgData name="Rolando Rojas Sanfuentes (Alumno)" userId="2c56a9b6-e5a8-48f6-bb7c-ce0866612bbb" providerId="ADAL" clId="{EDE87E0B-BE4A-46C6-BB28-15281E54BCA4}" dt="2024-03-14T23:30:39.942" v="53" actId="478"/>
+        <pc:sldMkLst>
+          <pc:docMk/>
+          <pc:sldMk cId="4203861452" sldId="309"/>
+        </pc:sldMkLst>
+        <pc:spChg chg="del">
+          <ac:chgData name="Rolando Rojas Sanfuentes (Alumno)" userId="2c56a9b6-e5a8-48f6-bb7c-ce0866612bbb" providerId="ADAL" clId="{EDE87E0B-BE4A-46C6-BB28-15281E54BCA4}" dt="2024-03-14T23:30:39.942" v="53" actId="478"/>
+          <ac:spMkLst>
+            <pc:docMk/>
+            <pc:sldMk cId="4203861452" sldId="309"/>
+            <ac:spMk id="3" creationId="{350B71F4-696F-F626-2CB3-AA1BDF39476A}"/>
+          </ac:spMkLst>
+        </pc:spChg>
+        <pc:picChg chg="del">
+          <ac:chgData name="Rolando Rojas Sanfuentes (Alumno)" userId="2c56a9b6-e5a8-48f6-bb7c-ce0866612bbb" providerId="ADAL" clId="{EDE87E0B-BE4A-46C6-BB28-15281E54BCA4}" dt="2024-03-14T23:28:28.446" v="48" actId="478"/>
+          <ac:picMkLst>
+            <pc:docMk/>
+            <pc:sldMk cId="4203861452" sldId="309"/>
+            <ac:picMk id="4" creationId="{E36C7C81-8699-25C4-82E0-8BACB93F9802}"/>
+          </ac:picMkLst>
+        </pc:picChg>
+        <pc:picChg chg="add mod">
+          <ac:chgData name="Rolando Rojas Sanfuentes (Alumno)" userId="2c56a9b6-e5a8-48f6-bb7c-ce0866612bbb" providerId="ADAL" clId="{EDE87E0B-BE4A-46C6-BB28-15281E54BCA4}" dt="2024-03-14T23:30:37.566" v="52" actId="14100"/>
+          <ac:picMkLst>
+            <pc:docMk/>
+            <pc:sldMk cId="4203861452" sldId="309"/>
+            <ac:picMk id="5" creationId="{2ABD15C3-C9C6-6748-F81E-C78920FC6C46}"/>
+          </ac:picMkLst>
+        </pc:picChg>
+      </pc:sldChg>
+    </pc:docChg>
+  </pc:docChgLst>
   <pc:docChgLst>
     <pc:chgData name="Rolando Rojas Sanfuentes (Alumno)" userId="2c56a9b6-e5a8-48f6-bb7c-ce0866612bbb" providerId="ADAL" clId="{52D01A48-4AA0-4FDB-B1ED-11ECB3F35E11}"/>
     <pc:docChg chg="undo redo custSel addSld delSld modSld sldOrd delMainMaster">
@@ -2511,6 +2584,224 @@
   <p:cSld>
     <p:spTree>
       <p:nvGrpSpPr>
+        <p:cNvPr id="1" name="Shape 291"/>
+        <p:cNvGrpSpPr/>
+        <p:nvPr/>
+      </p:nvGrpSpPr>
+      <p:grpSpPr>
+        <a:xfrm>
+          <a:off x="0" y="0"/>
+          <a:ext cx="0" cy="0"/>
+          <a:chOff x="0" y="0"/>
+          <a:chExt cx="0" cy="0"/>
+        </a:xfrm>
+      </p:grpSpPr>
+      <p:sp>
+        <p:nvSpPr>
+          <p:cNvPr id="292" name="Google Shape;292;gcc9050bdf8_0_273:notes"/>
+          <p:cNvSpPr>
+            <a:spLocks noGrp="1" noRot="1" noChangeAspect="1"/>
+          </p:cNvSpPr>
+          <p:nvPr>
+            <p:ph type="sldImg" idx="2"/>
+          </p:nvPr>
+        </p:nvSpPr>
+        <p:spPr>
+          <a:xfrm>
+            <a:off x="381000" y="685800"/>
+            <a:ext cx="6096000" cy="3429000"/>
+          </a:xfrm>
+          <a:custGeom>
+            <a:avLst/>
+            <a:gdLst/>
+            <a:ahLst/>
+            <a:cxnLst/>
+            <a:rect l="l" t="t" r="r" b="b"/>
+            <a:pathLst>
+              <a:path w="120000" h="120000" extrusionOk="0">
+                <a:moveTo>
+                  <a:pt x="0" y="0"/>
+                </a:moveTo>
+                <a:lnTo>
+                  <a:pt x="120000" y="0"/>
+                </a:lnTo>
+                <a:lnTo>
+                  <a:pt x="120000" y="120000"/>
+                </a:lnTo>
+                <a:lnTo>
+                  <a:pt x="0" y="120000"/>
+                </a:lnTo>
+                <a:close/>
+              </a:path>
+            </a:pathLst>
+          </a:custGeom>
+        </p:spPr>
+      </p:sp>
+      <p:sp>
+        <p:nvSpPr>
+          <p:cNvPr id="293" name="Google Shape;293;gcc9050bdf8_0_273:notes"/>
+          <p:cNvSpPr txBox="1">
+            <a:spLocks noGrp="1"/>
+          </p:cNvSpPr>
+          <p:nvPr>
+            <p:ph type="body" idx="1"/>
+          </p:nvPr>
+        </p:nvSpPr>
+        <p:spPr>
+          <a:xfrm>
+            <a:off x="685800" y="4343400"/>
+            <a:ext cx="5486400" cy="4114800"/>
+          </a:xfrm>
+          <a:prstGeom prst="rect">
+            <a:avLst/>
+          </a:prstGeom>
+        </p:spPr>
+        <p:txBody>
+          <a:bodyPr spcFirstLastPara="1" wrap="square" lIns="91425" tIns="91425" rIns="91425" bIns="91425" anchor="t" anchorCtr="0">
+            <a:noAutofit/>
+          </a:bodyPr>
+          <a:lstStyle/>
+          <a:p>
+            <a:pPr marL="0" lvl="0" indent="0" algn="l" rtl="0">
+              <a:spcBef>
+                <a:spcPts val="0"/>
+              </a:spcBef>
+              <a:spcAft>
+                <a:spcPts val="0"/>
+              </a:spcAft>
+              <a:buNone/>
+            </a:pPr>
+            <a:endParaRPr/>
+          </a:p>
+        </p:txBody>
+      </p:sp>
+    </p:spTree>
+    <p:extLst>
+      <p:ext uri="{BB962C8B-B14F-4D97-AF65-F5344CB8AC3E}">
+        <p14:creationId xmlns:p14="http://schemas.microsoft.com/office/powerpoint/2010/main" val="1115264360"/>
+      </p:ext>
+    </p:extLst>
+  </p:cSld>
+  <p:clrMapOvr>
+    <a:masterClrMapping/>
+  </p:clrMapOvr>
+</p:notes>
+</file>
+
+<file path=ppt/notesSlides/notesSlide15.xml><?xml version="1.0" encoding="utf-8"?>
+<p:notes xmlns:a="http://schemas.openxmlformats.org/drawingml/2006/main" xmlns:r="http://schemas.openxmlformats.org/officeDocument/2006/relationships" xmlns:p="http://schemas.openxmlformats.org/presentationml/2006/main" showMasterSp="0" showMasterPhAnim="0">
+  <p:cSld>
+    <p:spTree>
+      <p:nvGrpSpPr>
+        <p:cNvPr id="1" name="Shape 291"/>
+        <p:cNvGrpSpPr/>
+        <p:nvPr/>
+      </p:nvGrpSpPr>
+      <p:grpSpPr>
+        <a:xfrm>
+          <a:off x="0" y="0"/>
+          <a:ext cx="0" cy="0"/>
+          <a:chOff x="0" y="0"/>
+          <a:chExt cx="0" cy="0"/>
+        </a:xfrm>
+      </p:grpSpPr>
+      <p:sp>
+        <p:nvSpPr>
+          <p:cNvPr id="292" name="Google Shape;292;gcc9050bdf8_0_273:notes"/>
+          <p:cNvSpPr>
+            <a:spLocks noGrp="1" noRot="1" noChangeAspect="1"/>
+          </p:cNvSpPr>
+          <p:nvPr>
+            <p:ph type="sldImg" idx="2"/>
+          </p:nvPr>
+        </p:nvSpPr>
+        <p:spPr>
+          <a:xfrm>
+            <a:off x="381000" y="685800"/>
+            <a:ext cx="6096000" cy="3429000"/>
+          </a:xfrm>
+          <a:custGeom>
+            <a:avLst/>
+            <a:gdLst/>
+            <a:ahLst/>
+            <a:cxnLst/>
+            <a:rect l="l" t="t" r="r" b="b"/>
+            <a:pathLst>
+              <a:path w="120000" h="120000" extrusionOk="0">
+                <a:moveTo>
+                  <a:pt x="0" y="0"/>
+                </a:moveTo>
+                <a:lnTo>
+                  <a:pt x="120000" y="0"/>
+                </a:lnTo>
+                <a:lnTo>
+                  <a:pt x="120000" y="120000"/>
+                </a:lnTo>
+                <a:lnTo>
+                  <a:pt x="0" y="120000"/>
+                </a:lnTo>
+                <a:close/>
+              </a:path>
+            </a:pathLst>
+          </a:custGeom>
+        </p:spPr>
+      </p:sp>
+      <p:sp>
+        <p:nvSpPr>
+          <p:cNvPr id="293" name="Google Shape;293;gcc9050bdf8_0_273:notes"/>
+          <p:cNvSpPr txBox="1">
+            <a:spLocks noGrp="1"/>
+          </p:cNvSpPr>
+          <p:nvPr>
+            <p:ph type="body" idx="1"/>
+          </p:nvPr>
+        </p:nvSpPr>
+        <p:spPr>
+          <a:xfrm>
+            <a:off x="685800" y="4343400"/>
+            <a:ext cx="5486400" cy="4114800"/>
+          </a:xfrm>
+          <a:prstGeom prst="rect">
+            <a:avLst/>
+          </a:prstGeom>
+        </p:spPr>
+        <p:txBody>
+          <a:bodyPr spcFirstLastPara="1" wrap="square" lIns="91425" tIns="91425" rIns="91425" bIns="91425" anchor="t" anchorCtr="0">
+            <a:noAutofit/>
+          </a:bodyPr>
+          <a:lstStyle/>
+          <a:p>
+            <a:pPr marL="0" lvl="0" indent="0" algn="l" rtl="0">
+              <a:spcBef>
+                <a:spcPts val="0"/>
+              </a:spcBef>
+              <a:spcAft>
+                <a:spcPts val="0"/>
+              </a:spcAft>
+              <a:buNone/>
+            </a:pPr>
+            <a:endParaRPr/>
+          </a:p>
+        </p:txBody>
+      </p:sp>
+    </p:spTree>
+    <p:extLst>
+      <p:ext uri="{BB962C8B-B14F-4D97-AF65-F5344CB8AC3E}">
+        <p14:creationId xmlns:p14="http://schemas.microsoft.com/office/powerpoint/2010/main" val="2467983223"/>
+      </p:ext>
+    </p:extLst>
+  </p:cSld>
+  <p:clrMapOvr>
+    <a:masterClrMapping/>
+  </p:clrMapOvr>
+</p:notes>
+</file>
+
+<file path=ppt/notesSlides/notesSlide16.xml><?xml version="1.0" encoding="utf-8"?>
+<p:notes xmlns:a="http://schemas.openxmlformats.org/drawingml/2006/main" xmlns:r="http://schemas.openxmlformats.org/officeDocument/2006/relationships" xmlns:p="http://schemas.openxmlformats.org/presentationml/2006/main" showMasterSp="0" showMasterPhAnim="0">
+  <p:cSld>
+    <p:spTree>
+      <p:nvGrpSpPr>
         <p:cNvPr id="1" name="Shape 204"/>
         <p:cNvGrpSpPr/>
         <p:nvPr/>
@@ -14012,6 +14303,319 @@
   <p:cSld>
     <p:spTree>
       <p:nvGrpSpPr>
+        <p:cNvPr id="1" name="Shape 294"/>
+        <p:cNvGrpSpPr/>
+        <p:nvPr/>
+      </p:nvGrpSpPr>
+      <p:grpSpPr>
+        <a:xfrm>
+          <a:off x="0" y="0"/>
+          <a:ext cx="0" cy="0"/>
+          <a:chOff x="0" y="0"/>
+          <a:chExt cx="0" cy="0"/>
+        </a:xfrm>
+      </p:grpSpPr>
+      <p:sp>
+        <p:nvSpPr>
+          <p:cNvPr id="295" name="Google Shape;295;p33"/>
+          <p:cNvSpPr txBox="1">
+            <a:spLocks noGrp="1"/>
+          </p:cNvSpPr>
+          <p:nvPr>
+            <p:ph type="title" idx="6"/>
+          </p:nvPr>
+        </p:nvSpPr>
+        <p:spPr>
+          <a:xfrm>
+            <a:off x="719988" y="459128"/>
+            <a:ext cx="7704000" cy="572700"/>
+          </a:xfrm>
+          <a:prstGeom prst="rect">
+            <a:avLst/>
+          </a:prstGeom>
+        </p:spPr>
+        <p:txBody>
+          <a:bodyPr spcFirstLastPara="1" wrap="square" lIns="91425" tIns="91425" rIns="91425" bIns="91425" anchor="t" anchorCtr="0">
+            <a:noAutofit/>
+          </a:bodyPr>
+          <a:lstStyle/>
+          <a:p>
+            <a:pPr marL="0" lvl="0" indent="0" algn="l" rtl="0">
+              <a:spcBef>
+                <a:spcPts val="0"/>
+              </a:spcBef>
+              <a:spcAft>
+                <a:spcPts val="0"/>
+              </a:spcAft>
+              <a:buNone/>
+            </a:pPr>
+            <a:r>
+              <a:rPr lang="en" dirty="0">
+                <a:solidFill>
+                  <a:schemeClr val="accent2"/>
+                </a:solidFill>
+              </a:rPr>
+              <a:t>&lt;/</a:t>
+            </a:r>
+            <a:r>
+              <a:rPr lang="en" dirty="0">
+                <a:solidFill>
+                  <a:schemeClr val="lt2"/>
+                </a:solidFill>
+              </a:rPr>
+              <a:t> </a:t>
+            </a:r>
+            <a:r>
+              <a:rPr lang="en" dirty="0">
+                <a:solidFill>
+                  <a:schemeClr val="tx1"/>
+                </a:solidFill>
+              </a:rPr>
+              <a:t>Ejercicio 2</a:t>
+            </a:r>
+            <a:endParaRPr dirty="0"/>
+          </a:p>
+        </p:txBody>
+      </p:sp>
+      <p:sp>
+        <p:nvSpPr>
+          <p:cNvPr id="297" name="Google Shape;297;p33"/>
+          <p:cNvSpPr txBox="1">
+            <a:spLocks noGrp="1"/>
+          </p:cNvSpPr>
+          <p:nvPr>
+            <p:ph type="subTitle" idx="1"/>
+          </p:nvPr>
+        </p:nvSpPr>
+        <p:spPr>
+          <a:xfrm>
+            <a:off x="719988" y="1098768"/>
+            <a:ext cx="7959192" cy="3244632"/>
+          </a:xfrm>
+          <a:prstGeom prst="rect">
+            <a:avLst/>
+          </a:prstGeom>
+        </p:spPr>
+        <p:txBody>
+          <a:bodyPr spcFirstLastPara="1" wrap="square" lIns="91425" tIns="91425" rIns="91425" bIns="91425" anchor="t" anchorCtr="0">
+            <a:noAutofit/>
+          </a:bodyPr>
+          <a:lstStyle/>
+          <a:p>
+            <a:pPr marL="0" indent="0"/>
+            <a:r>
+              <a:rPr lang="es-CL" sz="1800" dirty="0"/>
+              <a:t>Escribe un programa que convierta grados Fahrenheit</a:t>
+            </a:r>
+          </a:p>
+          <a:p>
+            <a:pPr marL="0" indent="0"/>
+            <a:r>
+              <a:rPr lang="es-CL" sz="1800" dirty="0"/>
+              <a:t>a Celsius. La fórmula para la conversión es:</a:t>
+            </a:r>
+          </a:p>
+          <a:p>
+            <a:pPr marL="0" indent="0"/>
+            <a:r>
+              <a:rPr lang="es-CL" sz="1800" dirty="0"/>
+              <a:t>C = (F − 32 ) × 5/9 , donde C es la temperatura en</a:t>
+            </a:r>
+          </a:p>
+          <a:p>
+            <a:pPr marL="0" indent="0"/>
+            <a:r>
+              <a:rPr lang="es-CL" sz="1800" dirty="0"/>
+              <a:t>Celsius y F es la temperatura en Fahrenheit.</a:t>
+            </a:r>
+          </a:p>
+          <a:p>
+            <a:pPr marL="0" indent="0"/>
+            <a:endParaRPr lang="es-CL" sz="1800" dirty="0"/>
+          </a:p>
+          <a:p>
+            <a:pPr marL="0" indent="0"/>
+            <a:endParaRPr lang="es-CL" sz="1800" dirty="0"/>
+          </a:p>
+          <a:p>
+            <a:pPr marL="0" indent="0"/>
+            <a:r>
+              <a:rPr lang="es-CL" sz="1800" dirty="0"/>
+              <a:t>Ejemplo de ejecución:</a:t>
+            </a:r>
+          </a:p>
+        </p:txBody>
+      </p:sp>
+      <p:pic>
+        <p:nvPicPr>
+          <p:cNvPr id="3" name="Imagen 2">
+            <a:extLst>
+              <a:ext uri="{FF2B5EF4-FFF2-40B4-BE49-F238E27FC236}">
+                <a16:creationId xmlns:a16="http://schemas.microsoft.com/office/drawing/2014/main" id="{CAF7AEE0-F44D-E903-297B-A852795B382E}"/>
+              </a:ext>
+            </a:extLst>
+          </p:cNvPr>
+          <p:cNvPicPr>
+            <a:picLocks noChangeAspect="1"/>
+          </p:cNvPicPr>
+          <p:nvPr/>
+        </p:nvPicPr>
+        <p:blipFill>
+          <a:blip r:embed="rId3"/>
+          <a:stretch>
+            <a:fillRect/>
+          </a:stretch>
+        </p:blipFill>
+        <p:spPr>
+          <a:xfrm>
+            <a:off x="817655" y="3316829"/>
+            <a:ext cx="7861525" cy="453338"/>
+          </a:xfrm>
+          <a:prstGeom prst="rect">
+            <a:avLst/>
+          </a:prstGeom>
+        </p:spPr>
+      </p:pic>
+    </p:spTree>
+    <p:extLst>
+      <p:ext uri="{BB962C8B-B14F-4D97-AF65-F5344CB8AC3E}">
+        <p14:creationId xmlns:p14="http://schemas.microsoft.com/office/powerpoint/2010/main" val="3706274740"/>
+      </p:ext>
+    </p:extLst>
+  </p:cSld>
+  <p:clrMapOvr>
+    <a:masterClrMapping/>
+  </p:clrMapOvr>
+</p:sld>
+</file>
+
+<file path=ppt/slides/slide15.xml><?xml version="1.0" encoding="utf-8"?>
+<p:sld xmlns:a="http://schemas.openxmlformats.org/drawingml/2006/main" xmlns:r="http://schemas.openxmlformats.org/officeDocument/2006/relationships" xmlns:p="http://schemas.openxmlformats.org/presentationml/2006/main">
+  <p:cSld>
+    <p:spTree>
+      <p:nvGrpSpPr>
+        <p:cNvPr id="1" name="Shape 294"/>
+        <p:cNvGrpSpPr/>
+        <p:nvPr/>
+      </p:nvGrpSpPr>
+      <p:grpSpPr>
+        <a:xfrm>
+          <a:off x="0" y="0"/>
+          <a:ext cx="0" cy="0"/>
+          <a:chOff x="0" y="0"/>
+          <a:chExt cx="0" cy="0"/>
+        </a:xfrm>
+      </p:grpSpPr>
+      <p:sp>
+        <p:nvSpPr>
+          <p:cNvPr id="295" name="Google Shape;295;p33"/>
+          <p:cNvSpPr txBox="1">
+            <a:spLocks noGrp="1"/>
+          </p:cNvSpPr>
+          <p:nvPr>
+            <p:ph type="title" idx="6"/>
+          </p:nvPr>
+        </p:nvSpPr>
+        <p:spPr>
+          <a:xfrm>
+            <a:off x="719988" y="459128"/>
+            <a:ext cx="7704000" cy="572700"/>
+          </a:xfrm>
+          <a:prstGeom prst="rect">
+            <a:avLst/>
+          </a:prstGeom>
+        </p:spPr>
+        <p:txBody>
+          <a:bodyPr spcFirstLastPara="1" wrap="square" lIns="91425" tIns="91425" rIns="91425" bIns="91425" anchor="t" anchorCtr="0">
+            <a:noAutofit/>
+          </a:bodyPr>
+          <a:lstStyle/>
+          <a:p>
+            <a:pPr marL="0" lvl="0" indent="0" algn="l" rtl="0">
+              <a:spcBef>
+                <a:spcPts val="0"/>
+              </a:spcBef>
+              <a:spcAft>
+                <a:spcPts val="0"/>
+              </a:spcAft>
+              <a:buNone/>
+            </a:pPr>
+            <a:r>
+              <a:rPr lang="en" dirty="0">
+                <a:solidFill>
+                  <a:schemeClr val="accent2"/>
+                </a:solidFill>
+              </a:rPr>
+              <a:t>&lt;/</a:t>
+            </a:r>
+            <a:r>
+              <a:rPr lang="en" dirty="0">
+                <a:solidFill>
+                  <a:schemeClr val="lt2"/>
+                </a:solidFill>
+              </a:rPr>
+              <a:t> </a:t>
+            </a:r>
+            <a:r>
+              <a:rPr lang="en" dirty="0">
+                <a:solidFill>
+                  <a:schemeClr val="tx1"/>
+                </a:solidFill>
+              </a:rPr>
+              <a:t>Solución</a:t>
+            </a:r>
+            <a:endParaRPr dirty="0"/>
+          </a:p>
+        </p:txBody>
+      </p:sp>
+      <p:pic>
+        <p:nvPicPr>
+          <p:cNvPr id="5" name="Imagen 4">
+            <a:extLst>
+              <a:ext uri="{FF2B5EF4-FFF2-40B4-BE49-F238E27FC236}">
+                <a16:creationId xmlns:a16="http://schemas.microsoft.com/office/drawing/2014/main" id="{2ABD15C3-C9C6-6748-F81E-C78920FC6C46}"/>
+              </a:ext>
+            </a:extLst>
+          </p:cNvPr>
+          <p:cNvPicPr>
+            <a:picLocks noChangeAspect="1"/>
+          </p:cNvPicPr>
+          <p:nvPr/>
+        </p:nvPicPr>
+        <p:blipFill>
+          <a:blip r:embed="rId3"/>
+          <a:stretch>
+            <a:fillRect/>
+          </a:stretch>
+        </p:blipFill>
+        <p:spPr>
+          <a:xfrm>
+            <a:off x="719988" y="1356660"/>
+            <a:ext cx="8034268" cy="1677485"/>
+          </a:xfrm>
+          <a:prstGeom prst="rect">
+            <a:avLst/>
+          </a:prstGeom>
+        </p:spPr>
+      </p:pic>
+    </p:spTree>
+    <p:extLst>
+      <p:ext uri="{BB962C8B-B14F-4D97-AF65-F5344CB8AC3E}">
+        <p14:creationId xmlns:p14="http://schemas.microsoft.com/office/powerpoint/2010/main" val="4203861452"/>
+      </p:ext>
+    </p:extLst>
+  </p:cSld>
+  <p:clrMapOvr>
+    <a:masterClrMapping/>
+  </p:clrMapOvr>
+</p:sld>
+</file>
+
+<file path=ppt/slides/slide16.xml><?xml version="1.0" encoding="utf-8"?>
+<p:sld xmlns:a="http://schemas.openxmlformats.org/drawingml/2006/main" xmlns:r="http://schemas.openxmlformats.org/officeDocument/2006/relationships" xmlns:p="http://schemas.openxmlformats.org/presentationml/2006/main">
+  <p:cSld>
+    <p:spTree>
+      <p:nvGrpSpPr>
         <p:cNvPr id="1" name="Shape 207"/>
         <p:cNvGrpSpPr/>
         <p:nvPr/>

</xml_diff>